<commit_message>
add notes in slides ppt files of week3
</commit_message>
<xml_diff>
--- a/DAT202.1x_Mod_3_Slides/DAT202.1x Mod 3 Lesson 2.pptx
+++ b/DAT202.1x_Mod_3_Slides/DAT202.1x Mod 3 Lesson 2.pptx
@@ -126,10 +126,10 @@
   </p:defaultTextStyle>
   <p:extLst>
     <p:ext uri="{EFAFB233-063F-42B5-8137-9DF3F51BA10A}">
-      <p15:sldGuideLst xmlns:p15="http://schemas.microsoft.com/office/powerpoint/2012/main"/>
+      <p15:sldGuideLst xmlns:p15="http://schemas.microsoft.com/office/powerpoint/2012/main" xmlns=""/>
     </p:ext>
     <p:ext uri="{2D200454-40CA-4A62-9FC3-DE9A4176ACB9}">
-      <p15:notesGuideLst xmlns:p15="http://schemas.microsoft.com/office/powerpoint/2012/main"/>
+      <p15:notesGuideLst xmlns:p15="http://schemas.microsoft.com/office/powerpoint/2012/main" xmlns=""/>
     </p:ext>
   </p:extLst>
 </p:presentation>
@@ -217,7 +217,8 @@
           <a:p>
             <a:fld id="{312E7B4A-039C-48A2-9B2C-AF16AA3873D8}" type="datetimeFigureOut">
               <a:rPr lang="en-US" smtClean="0"/>
-              <a:t>6/22/2015</a:t>
+              <a:pPr/>
+              <a:t>8/27/2015</a:t>
             </a:fld>
             <a:endParaRPr lang="en-US"/>
           </a:p>
@@ -283,6 +284,7 @@
           <a:p>
             <a:fld id="{CF5FCDD8-505C-48BF-B1E5-CD9B258934D2}" type="slidenum">
               <a:rPr lang="en-US" smtClean="0"/>
+              <a:pPr/>
               <a:t>‹#›</a:t>
             </a:fld>
             <a:endParaRPr lang="en-US"/>
@@ -292,7 +294,7 @@
     </p:spTree>
     <p:extLst>
       <p:ext uri="{BB962C8B-B14F-4D97-AF65-F5344CB8AC3E}">
-        <p14:creationId xmlns:p14="http://schemas.microsoft.com/office/powerpoint/2010/main" val="1781922763"/>
+        <p14:creationId xmlns:p14="http://schemas.microsoft.com/office/powerpoint/2010/main" xmlns="" val="1781922763"/>
       </p:ext>
     </p:extLst>
   </p:cSld>
@@ -382,7 +384,8 @@
           <a:p>
             <a:fld id="{DA005A0C-54D9-45AA-87D4-C551D08DFCE1}" type="datetimeFigureOut">
               <a:rPr lang="en-US" smtClean="0"/>
-              <a:t>6/22/2015</a:t>
+              <a:pPr/>
+              <a:t>8/27/2015</a:t>
             </a:fld>
             <a:endParaRPr lang="en-US"/>
           </a:p>
@@ -541,6 +544,7 @@
           <a:p>
             <a:fld id="{4CFD207A-07DF-40AD-A916-9872E089CE7A}" type="slidenum">
               <a:rPr lang="en-US" smtClean="0"/>
+              <a:pPr/>
               <a:t>‹#›</a:t>
             </a:fld>
             <a:endParaRPr lang="en-US"/>
@@ -550,7 +554,7 @@
     </p:spTree>
     <p:extLst>
       <p:ext uri="{BB962C8B-B14F-4D97-AF65-F5344CB8AC3E}">
-        <p14:creationId xmlns:p14="http://schemas.microsoft.com/office/powerpoint/2010/main" val="1295718610"/>
+        <p14:creationId xmlns:p14="http://schemas.microsoft.com/office/powerpoint/2010/main" xmlns="" val="1295718610"/>
       </p:ext>
     </p:extLst>
   </p:cSld>
@@ -730,7 +734,7 @@
     </p:spTree>
     <p:extLst>
       <p:ext uri="{BB962C8B-B14F-4D97-AF65-F5344CB8AC3E}">
-        <p14:creationId xmlns:p14="http://schemas.microsoft.com/office/powerpoint/2010/main" val="1088711496"/>
+        <p14:creationId xmlns:p14="http://schemas.microsoft.com/office/powerpoint/2010/main" xmlns="" val="1088711496"/>
       </p:ext>
     </p:extLst>
   </p:cSld>
@@ -1033,7 +1037,7 @@
           <a:blip r:embed="rId2" cstate="print">
             <a:extLst>
               <a:ext uri="{28A0092B-C50C-407E-A947-70E740481C1C}">
-                <a14:useLocalDpi xmlns:a14="http://schemas.microsoft.com/office/drawing/2010/main" val="0"/>
+                <a14:useLocalDpi xmlns:a14="http://schemas.microsoft.com/office/drawing/2010/main" xmlns="" val="0"/>
               </a:ext>
             </a:extLst>
           </a:blip>
@@ -1053,7 +1057,7 @@
     </p:spTree>
     <p:extLst>
       <p:ext uri="{BB962C8B-B14F-4D97-AF65-F5344CB8AC3E}">
-        <p14:creationId xmlns:p14="http://schemas.microsoft.com/office/powerpoint/2010/main" val="942519667"/>
+        <p14:creationId xmlns:p14="http://schemas.microsoft.com/office/powerpoint/2010/main" xmlns="" val="942519667"/>
       </p:ext>
     </p:extLst>
   </p:cSld>
@@ -1069,7 +1073,7 @@
   </p:timing>
   <p:extLst mod="1">
     <p:ext uri="{DCECCB84-F9BA-43D5-87BE-67443E8EF086}">
-      <p15:sldGuideLst xmlns:p15="http://schemas.microsoft.com/office/powerpoint/2012/main">
+      <p15:sldGuideLst xmlns:p15="http://schemas.microsoft.com/office/powerpoint/2012/main" xmlns="">
         <p15:guide id="1" orient="horz" pos="3792">
           <p15:clr>
             <a:srgbClr val="FBAE40"/>
@@ -1450,7 +1454,7 @@
           <a:blip r:embed="rId2" cstate="print">
             <a:extLst>
               <a:ext uri="{28A0092B-C50C-407E-A947-70E740481C1C}">
-                <a14:useLocalDpi xmlns:a14="http://schemas.microsoft.com/office/drawing/2010/main" val="0"/>
+                <a14:useLocalDpi xmlns:a14="http://schemas.microsoft.com/office/drawing/2010/main" xmlns="" val="0"/>
               </a:ext>
             </a:extLst>
           </a:blip>
@@ -1647,7 +1651,7 @@
     </p:spTree>
     <p:extLst>
       <p:ext uri="{BB962C8B-B14F-4D97-AF65-F5344CB8AC3E}">
-        <p14:creationId xmlns:p14="http://schemas.microsoft.com/office/powerpoint/2010/main" val="3891348690"/>
+        <p14:creationId xmlns:p14="http://schemas.microsoft.com/office/powerpoint/2010/main" xmlns="" val="3891348690"/>
       </p:ext>
     </p:extLst>
   </p:cSld>
@@ -1663,7 +1667,7 @@
   </p:timing>
   <p:extLst mod="1">
     <p:ext uri="{DCECCB84-F9BA-43D5-87BE-67443E8EF086}">
-      <p15:sldGuideLst xmlns:p15="http://schemas.microsoft.com/office/powerpoint/2012/main">
+      <p15:sldGuideLst xmlns:p15="http://schemas.microsoft.com/office/powerpoint/2012/main" xmlns="">
         <p15:guide id="1" orient="horz" pos="2160">
           <p15:clr>
             <a:srgbClr val="FBAE40"/>
@@ -1816,7 +1820,7 @@
     </p:spTree>
     <p:extLst>
       <p:ext uri="{BB962C8B-B14F-4D97-AF65-F5344CB8AC3E}">
-        <p14:creationId xmlns:p14="http://schemas.microsoft.com/office/powerpoint/2010/main" val="3823260024"/>
+        <p14:creationId xmlns:p14="http://schemas.microsoft.com/office/powerpoint/2010/main" xmlns="" val="3823260024"/>
       </p:ext>
     </p:extLst>
   </p:cSld>
@@ -1975,7 +1979,7 @@
     </p:spTree>
     <p:extLst>
       <p:ext uri="{BB962C8B-B14F-4D97-AF65-F5344CB8AC3E}">
-        <p14:creationId xmlns:p14="http://schemas.microsoft.com/office/powerpoint/2010/main" val="1607745834"/>
+        <p14:creationId xmlns:p14="http://schemas.microsoft.com/office/powerpoint/2010/main" xmlns="" val="1607745834"/>
       </p:ext>
     </p:extLst>
   </p:cSld>
@@ -2215,7 +2219,7 @@
     </p:spTree>
     <p:extLst>
       <p:ext uri="{BB962C8B-B14F-4D97-AF65-F5344CB8AC3E}">
-        <p14:creationId xmlns:p14="http://schemas.microsoft.com/office/powerpoint/2010/main" val="3199461456"/>
+        <p14:creationId xmlns:p14="http://schemas.microsoft.com/office/powerpoint/2010/main" xmlns="" val="3199461456"/>
       </p:ext>
     </p:extLst>
   </p:cSld>
@@ -2607,7 +2611,7 @@
     </p:spTree>
     <p:extLst>
       <p:ext uri="{BB962C8B-B14F-4D97-AF65-F5344CB8AC3E}">
-        <p14:creationId xmlns:p14="http://schemas.microsoft.com/office/powerpoint/2010/main" val="669021601"/>
+        <p14:creationId xmlns:p14="http://schemas.microsoft.com/office/powerpoint/2010/main" xmlns="" val="669021601"/>
       </p:ext>
     </p:extLst>
   </p:cSld>
@@ -2667,7 +2671,7 @@
     </p:spTree>
     <p:extLst>
       <p:ext uri="{BB962C8B-B14F-4D97-AF65-F5344CB8AC3E}">
-        <p14:creationId xmlns:p14="http://schemas.microsoft.com/office/powerpoint/2010/main" val="67839895"/>
+        <p14:creationId xmlns:p14="http://schemas.microsoft.com/office/powerpoint/2010/main" xmlns="" val="67839895"/>
       </p:ext>
     </p:extLst>
   </p:cSld>
@@ -2704,7 +2708,7 @@
     </p:spTree>
     <p:extLst>
       <p:ext uri="{BB962C8B-B14F-4D97-AF65-F5344CB8AC3E}">
-        <p14:creationId xmlns:p14="http://schemas.microsoft.com/office/powerpoint/2010/main" val="1728541262"/>
+        <p14:creationId xmlns:p14="http://schemas.microsoft.com/office/powerpoint/2010/main" xmlns="" val="1728541262"/>
       </p:ext>
     </p:extLst>
   </p:cSld>
@@ -2887,7 +2891,7 @@
           <a:blip r:embed="rId2" cstate="print">
             <a:extLst>
               <a:ext uri="{28A0092B-C50C-407E-A947-70E740481C1C}">
-                <a14:useLocalDpi xmlns:a14="http://schemas.microsoft.com/office/drawing/2010/main" val="0"/>
+                <a14:useLocalDpi xmlns:a14="http://schemas.microsoft.com/office/drawing/2010/main" xmlns="" val="0"/>
               </a:ext>
             </a:extLst>
           </a:blip>
@@ -2907,18 +2911,18 @@
     </p:spTree>
     <p:extLst>
       <p:ext uri="{BB962C8B-B14F-4D97-AF65-F5344CB8AC3E}">
-        <p14:creationId xmlns:p14="http://schemas.microsoft.com/office/powerpoint/2010/main" val="2667837224"/>
+        <p14:creationId xmlns:p14="http://schemas.microsoft.com/office/powerpoint/2010/main" xmlns="" val="2667837224"/>
       </p:ext>
     </p:extLst>
   </p:cSld>
   <p:clrMapOvr>
     <a:masterClrMapping/>
   </p:clrMapOvr>
-  <mc:AlternateContent xmlns:mc="http://schemas.openxmlformats.org/markup-compatibility/2006" xmlns:p14="http://schemas.microsoft.com/office/powerpoint/2010/main">
-    <mc:Choice Requires="p14">
+  <mc:AlternateContent xmlns:mc="http://schemas.openxmlformats.org/markup-compatibility/2006">
+    <mc:Choice xmlns:p14="http://schemas.microsoft.com/office/powerpoint/2010/main" xmlns="" Requires="p14">
       <p:transition spd="slow" p14:dur="2000"/>
     </mc:Choice>
-    <mc:Fallback xmlns="">
+    <mc:Fallback>
       <p:transition spd="slow"/>
     </mc:Fallback>
   </mc:AlternateContent>
@@ -2990,7 +2994,7 @@
     </p:spTree>
     <p:extLst>
       <p:ext uri="{BB962C8B-B14F-4D97-AF65-F5344CB8AC3E}">
-        <p14:creationId xmlns:p14="http://schemas.microsoft.com/office/powerpoint/2010/main" val="3118783959"/>
+        <p14:creationId xmlns:p14="http://schemas.microsoft.com/office/powerpoint/2010/main" xmlns="" val="3118783959"/>
       </p:ext>
     </p:extLst>
   </p:cSld>
@@ -3326,7 +3330,7 @@
     </p:spTree>
     <p:extLst>
       <p:ext uri="{BB962C8B-B14F-4D97-AF65-F5344CB8AC3E}">
-        <p14:creationId xmlns:p14="http://schemas.microsoft.com/office/powerpoint/2010/main" val="897692544"/>
+        <p14:creationId xmlns:p14="http://schemas.microsoft.com/office/powerpoint/2010/main" xmlns="" val="897692544"/>
       </p:ext>
     </p:extLst>
   </p:cSld>
@@ -3386,7 +3390,7 @@
     </p:spTree>
     <p:extLst>
       <p:ext uri="{BB962C8B-B14F-4D97-AF65-F5344CB8AC3E}">
-        <p14:creationId xmlns:p14="http://schemas.microsoft.com/office/powerpoint/2010/main" val="3503535022"/>
+        <p14:creationId xmlns:p14="http://schemas.microsoft.com/office/powerpoint/2010/main" xmlns="" val="3503535022"/>
       </p:ext>
     </p:extLst>
   </p:cSld>
@@ -3471,7 +3475,7 @@
     </p:spTree>
     <p:extLst>
       <p:ext uri="{BB962C8B-B14F-4D97-AF65-F5344CB8AC3E}">
-        <p14:creationId xmlns:p14="http://schemas.microsoft.com/office/powerpoint/2010/main" val="3079801983"/>
+        <p14:creationId xmlns:p14="http://schemas.microsoft.com/office/powerpoint/2010/main" xmlns="" val="3079801983"/>
       </p:ext>
     </p:extLst>
   </p:cSld>
@@ -3619,11 +3623,7 @@
             <a:pPr lvl="1"/>
             <a:r>
               <a:rPr lang="en-GB" dirty="0" smtClean="0"/>
-              <a:t>Define the </a:t>
-            </a:r>
-            <a:r>
-              <a:rPr lang="en-GB" dirty="0" smtClean="0"/>
-              <a:t>output schema as a Pig bag</a:t>
+              <a:t>Define the output schema as a Pig bag</a:t>
             </a:r>
           </a:p>
           <a:p>
@@ -3638,26 +3638,14 @@
             </a:r>
             <a:r>
               <a:rPr lang="en-GB" dirty="0" smtClean="0"/>
-              <a:t>ython function </a:t>
-            </a:r>
-            <a:r>
-              <a:rPr lang="en-GB" dirty="0" smtClean="0"/>
-              <a:t>that receives </a:t>
-            </a:r>
-            <a:r>
-              <a:rPr lang="en-GB" dirty="0" smtClean="0"/>
-              <a:t>an input parameter from Pig</a:t>
+              <a:t>ython function that receives an input parameter from Pig</a:t>
             </a:r>
           </a:p>
           <a:p>
             <a:pPr lvl="1"/>
             <a:r>
               <a:rPr lang="en-GB" dirty="0" smtClean="0"/>
-              <a:t>Return results </a:t>
-            </a:r>
-            <a:r>
-              <a:rPr lang="en-GB" dirty="0" smtClean="0"/>
-              <a:t>as fields based on the </a:t>
+              <a:t>Return results as fields based on the </a:t>
             </a:r>
             <a:r>
               <a:rPr lang="en-GB" dirty="0"/>
@@ -3680,7 +3668,7 @@
         <p:spPr>
           <a:xfrm>
             <a:off x="1402915" y="3786560"/>
-            <a:ext cx="9850774" cy="954107"/>
+            <a:ext cx="10495181" cy="954107"/>
           </a:xfrm>
           <a:prstGeom prst="rect">
             <a:avLst/>
@@ -3712,22 +3700,19 @@
                 <a:latin typeface="Courier New" panose="02070309020205020404" pitchFamily="49" charset="0"/>
                 <a:cs typeface="Courier New" panose="02070309020205020404" pitchFamily="49" charset="0"/>
               </a:rPr>
-              <a:t>("result: {(</a:t>
-            </a:r>
-            <a:r>
-              <a:rPr lang="en-GB" sz="2800" dirty="0" err="1" smtClean="0">
-                <a:latin typeface="Courier New" panose="02070309020205020404" pitchFamily="49" charset="0"/>
-                <a:cs typeface="Courier New" panose="02070309020205020404" pitchFamily="49" charset="0"/>
-              </a:rPr>
-              <a:t>a:chararray</a:t>
+              <a:t>("result: {(a:chararray, b:int</a:t>
             </a:r>
             <a:r>
               <a:rPr lang="en-GB" sz="2800" dirty="0" smtClean="0">
                 <a:latin typeface="Courier New" panose="02070309020205020404" pitchFamily="49" charset="0"/>
                 <a:cs typeface="Courier New" panose="02070309020205020404" pitchFamily="49" charset="0"/>
               </a:rPr>
-              <a:t>, b:int)}</a:t>
-            </a:r>
+              <a:t>)}")</a:t>
+            </a:r>
+            <a:endParaRPr lang="en-GB" sz="2800" dirty="0" smtClean="0">
+              <a:latin typeface="Courier New" panose="02070309020205020404" pitchFamily="49" charset="0"/>
+              <a:cs typeface="Courier New" panose="02070309020205020404" pitchFamily="49" charset="0"/>
+            </a:endParaRPr>
           </a:p>
           <a:p>
             <a:endParaRPr lang="en-GB" sz="2800" dirty="0">
@@ -3910,7 +3895,7 @@
     </p:spTree>
     <p:extLst>
       <p:ext uri="{BB962C8B-B14F-4D97-AF65-F5344CB8AC3E}">
-        <p14:creationId xmlns:p14="http://schemas.microsoft.com/office/powerpoint/2010/main" val="3307145666"/>
+        <p14:creationId xmlns:p14="http://schemas.microsoft.com/office/powerpoint/2010/main" xmlns="" val="3307145666"/>
       </p:ext>
     </p:extLst>
   </p:cSld>
@@ -4463,7 +4448,7 @@
     </p:spTree>
     <p:extLst>
       <p:ext uri="{BB962C8B-B14F-4D97-AF65-F5344CB8AC3E}">
-        <p14:creationId xmlns:p14="http://schemas.microsoft.com/office/powerpoint/2010/main" val="740486131"/>
+        <p14:creationId xmlns:p14="http://schemas.microsoft.com/office/powerpoint/2010/main" xmlns="" val="740486131"/>
       </p:ext>
     </p:extLst>
   </p:cSld>
@@ -4634,7 +4619,7 @@
     </p:spTree>
     <p:extLst>
       <p:ext uri="{BB962C8B-B14F-4D97-AF65-F5344CB8AC3E}">
-        <p14:creationId xmlns:p14="http://schemas.microsoft.com/office/powerpoint/2010/main" val="149594633"/>
+        <p14:creationId xmlns:p14="http://schemas.microsoft.com/office/powerpoint/2010/main" xmlns="" val="149594633"/>
       </p:ext>
     </p:extLst>
   </p:cSld>
@@ -4671,7 +4656,7 @@
     </p:spTree>
     <p:extLst>
       <p:ext uri="{BB962C8B-B14F-4D97-AF65-F5344CB8AC3E}">
-        <p14:creationId xmlns:p14="http://schemas.microsoft.com/office/powerpoint/2010/main" val="898363405"/>
+        <p14:creationId xmlns:p14="http://schemas.microsoft.com/office/powerpoint/2010/main" xmlns="" val="898363405"/>
       </p:ext>
     </p:extLst>
   </p:cSld>
@@ -4756,7 +4741,7 @@
     </p:spTree>
     <p:extLst>
       <p:ext uri="{BB962C8B-B14F-4D97-AF65-F5344CB8AC3E}">
-        <p14:creationId xmlns:p14="http://schemas.microsoft.com/office/powerpoint/2010/main" val="1026650393"/>
+        <p14:creationId xmlns:p14="http://schemas.microsoft.com/office/powerpoint/2010/main" xmlns="" val="1026650393"/>
       </p:ext>
     </p:extLst>
   </p:cSld>
@@ -4905,11 +4890,7 @@
             </a:r>
             <a:r>
               <a:rPr lang="en-GB" dirty="0" smtClean="0"/>
-              <a:t> </a:t>
-            </a:r>
-            <a:r>
-              <a:rPr lang="en-GB" dirty="0" smtClean="0"/>
-              <a:t>components</a:t>
+              <a:t> components</a:t>
             </a:r>
           </a:p>
           <a:p>
@@ -6132,7 +6113,7 @@
                 </a:ln>
                 <a:extLst>
                   <a:ext uri="{91240B29-F687-4F45-9708-019B960494DF}">
-                    <a14:hiddenLine xmlns:a14="http://schemas.microsoft.com/office/drawing/2010/main" w="9525">
+                    <a14:hiddenLine xmlns:a14="http://schemas.microsoft.com/office/drawing/2010/main" xmlns="" w="9525">
                       <a:solidFill>
                         <a:srgbClr val="000000"/>
                       </a:solidFill>
@@ -7284,7 +7265,7 @@
                 </a:ln>
                 <a:extLst>
                   <a:ext uri="{91240B29-F687-4F45-9708-019B960494DF}">
-                    <a14:hiddenLine xmlns:a14="http://schemas.microsoft.com/office/drawing/2010/main" w="9525">
+                    <a14:hiddenLine xmlns:a14="http://schemas.microsoft.com/office/drawing/2010/main" xmlns="" w="9525">
                       <a:solidFill>
                         <a:srgbClr val="000000"/>
                       </a:solidFill>
@@ -8004,7 +7985,7 @@
                 </a:ln>
                 <a:extLst>
                   <a:ext uri="{91240B29-F687-4F45-9708-019B960494DF}">
-                    <a14:hiddenLine xmlns:a14="http://schemas.microsoft.com/office/drawing/2010/main" w="9525">
+                    <a14:hiddenLine xmlns:a14="http://schemas.microsoft.com/office/drawing/2010/main" xmlns="" w="9525">
                       <a:solidFill>
                         <a:srgbClr val="000000"/>
                       </a:solidFill>
@@ -9156,7 +9137,7 @@
                 </a:ln>
                 <a:extLst>
                   <a:ext uri="{91240B29-F687-4F45-9708-019B960494DF}">
-                    <a14:hiddenLine xmlns:a14="http://schemas.microsoft.com/office/drawing/2010/main" w="9525">
+                    <a14:hiddenLine xmlns:a14="http://schemas.microsoft.com/office/drawing/2010/main" xmlns="" w="9525">
                       <a:solidFill>
                         <a:srgbClr val="000000"/>
                       </a:solidFill>
@@ -9351,7 +9332,7 @@
     </p:spTree>
     <p:extLst>
       <p:ext uri="{BB962C8B-B14F-4D97-AF65-F5344CB8AC3E}">
-        <p14:creationId xmlns:p14="http://schemas.microsoft.com/office/powerpoint/2010/main" val="1564805441"/>
+        <p14:creationId xmlns:p14="http://schemas.microsoft.com/office/powerpoint/2010/main" xmlns="" val="1564805441"/>
       </p:ext>
     </p:extLst>
   </p:cSld>
@@ -9737,7 +9718,7 @@
     </p:spTree>
     <p:extLst>
       <p:ext uri="{BB962C8B-B14F-4D97-AF65-F5344CB8AC3E}">
-        <p14:creationId xmlns:p14="http://schemas.microsoft.com/office/powerpoint/2010/main" val="3813714106"/>
+        <p14:creationId xmlns:p14="http://schemas.microsoft.com/office/powerpoint/2010/main" xmlns="" val="3813714106"/>
       </p:ext>
     </p:extLst>
   </p:cSld>
@@ -10054,7 +10035,7 @@
     </p:spTree>
     <p:extLst>
       <p:ext uri="{BB962C8B-B14F-4D97-AF65-F5344CB8AC3E}">
-        <p14:creationId xmlns:p14="http://schemas.microsoft.com/office/powerpoint/2010/main" val="3551963"/>
+        <p14:creationId xmlns:p14="http://schemas.microsoft.com/office/powerpoint/2010/main" xmlns="" val="3551963"/>
       </p:ext>
     </p:extLst>
   </p:cSld>
@@ -10223,7 +10204,7 @@
     </p:spTree>
     <p:extLst>
       <p:ext uri="{BB962C8B-B14F-4D97-AF65-F5344CB8AC3E}">
-        <p14:creationId xmlns:p14="http://schemas.microsoft.com/office/powerpoint/2010/main" val="686373899"/>
+        <p14:creationId xmlns:p14="http://schemas.microsoft.com/office/powerpoint/2010/main" xmlns="" val="686373899"/>
       </p:ext>
     </p:extLst>
   </p:cSld>
@@ -10308,7 +10289,7 @@
     </p:spTree>
     <p:extLst>
       <p:ext uri="{BB962C8B-B14F-4D97-AF65-F5344CB8AC3E}">
-        <p14:creationId xmlns:p14="http://schemas.microsoft.com/office/powerpoint/2010/main" val="3292837267"/>
+        <p14:creationId xmlns:p14="http://schemas.microsoft.com/office/powerpoint/2010/main" xmlns="" val="3292837267"/>
       </p:ext>
     </p:extLst>
   </p:cSld>
@@ -10607,7 +10588,7 @@
     </p:spTree>
     <p:extLst>
       <p:ext uri="{BB962C8B-B14F-4D97-AF65-F5344CB8AC3E}">
-        <p14:creationId xmlns:p14="http://schemas.microsoft.com/office/powerpoint/2010/main" val="791100998"/>
+        <p14:creationId xmlns:p14="http://schemas.microsoft.com/office/powerpoint/2010/main" xmlns="" val="791100998"/>
       </p:ext>
     </p:extLst>
   </p:cSld>
@@ -11100,7 +11081,7 @@
     </p:spTree>
     <p:extLst>
       <p:ext uri="{BB962C8B-B14F-4D97-AF65-F5344CB8AC3E}">
-        <p14:creationId xmlns:p14="http://schemas.microsoft.com/office/powerpoint/2010/main" val="520186793"/>
+        <p14:creationId xmlns:p14="http://schemas.microsoft.com/office/powerpoint/2010/main" xmlns="" val="520186793"/>
       </p:ext>
     </p:extLst>
   </p:cSld>
@@ -11556,7 +11537,7 @@
     </a:clrScheme>
     <a:fontScheme name="Office">
       <a:majorFont>
-        <a:latin typeface="Calibri Light" panose="020F0302020204030204"/>
+        <a:latin typeface="Calibri Light"/>
         <a:ea typeface=""/>
         <a:cs typeface=""/>
         <a:font script="Jpan" typeface="ＭＳ Ｐゴシック"/>
@@ -11591,7 +11572,7 @@
         <a:font script="Geor" typeface="Sylfaen"/>
       </a:majorFont>
       <a:minorFont>
-        <a:latin typeface="Calibri" panose="020F0502020204030204"/>
+        <a:latin typeface="Calibri"/>
         <a:ea typeface=""/>
         <a:cs typeface=""/>
         <a:font script="Jpan" typeface="ＭＳ Ｐゴシック"/>
@@ -11768,7 +11749,7 @@
   <a:extraClrSchemeLst/>
   <a:extLst>
     <a:ext uri="{05A4C25C-085E-4340-85A3-A5531E510DB2}">
-      <thm15:themeFamily xmlns:thm15="http://schemas.microsoft.com/office/thememl/2012/main" name="Office Theme" id="{62F939B6-93AF-4DB8-9C6B-D6C7DFDC589F}" vid="{4A3C46E8-61CC-4603-A589-7422A47A8E4A}"/>
+      <thm15:themeFamily xmlns:thm15="http://schemas.microsoft.com/office/thememl/2012/main" xmlns="" name="Office Theme" id="{62F939B6-93AF-4DB8-9C6B-D6C7DFDC589F}" vid="{4A3C46E8-61CC-4603-A589-7422A47A8E4A}"/>
     </a:ext>
   </a:extLst>
 </a:theme>
@@ -11817,7 +11798,7 @@
     </a:clrScheme>
     <a:fontScheme name="Office">
       <a:majorFont>
-        <a:latin typeface="Calibri Light" panose="020F0302020204030204"/>
+        <a:latin typeface="Calibri Light"/>
         <a:ea typeface=""/>
         <a:cs typeface=""/>
         <a:font script="Jpan" typeface="ＭＳ Ｐゴシック"/>
@@ -11852,7 +11833,7 @@
         <a:font script="Geor" typeface="Sylfaen"/>
       </a:majorFont>
       <a:minorFont>
-        <a:latin typeface="Calibri" panose="020F0502020204030204"/>
+        <a:latin typeface="Calibri"/>
         <a:ea typeface=""/>
         <a:cs typeface=""/>
         <a:font script="Jpan" typeface="ＭＳ Ｐゴシック"/>
@@ -12029,19 +12010,16 @@
   <a:extraClrSchemeLst/>
   <a:extLst>
     <a:ext uri="{05A4C25C-085E-4340-85A3-A5531E510DB2}">
-      <thm15:themeFamily xmlns:thm15="http://schemas.microsoft.com/office/thememl/2012/main" name="Office Theme" id="{62F939B6-93AF-4DB8-9C6B-D6C7DFDC589F}" vid="{4A3C46E8-61CC-4603-A589-7422A47A8E4A}"/>
+      <thm15:themeFamily xmlns:thm15="http://schemas.microsoft.com/office/thememl/2012/main" xmlns="" name="Office Theme" id="{62F939B6-93AF-4DB8-9C6B-D6C7DFDC589F}" vid="{4A3C46E8-61CC-4603-A589-7422A47A8E4A}"/>
     </a:ext>
   </a:extLst>
 </a:theme>
 </file>
 
 <file path=customXml/item1.xml><?xml version="1.0" encoding="utf-8"?>
-<?mso-contentType ?>
-<FormTemplates xmlns="http://schemas.microsoft.com/sharepoint/v3/contenttype/forms">
-  <Display>DocumentLibraryForm</Display>
-  <Edit>DocumentLibraryForm</Edit>
-  <New>DocumentLibraryForm</New>
-</FormTemplates>
+<p:properties xmlns:p="http://schemas.microsoft.com/office/2006/metadata/properties" xmlns:xsi="http://www.w3.org/2001/XMLSchema-instance" xmlns:pc="http://schemas.microsoft.com/office/infopath/2007/PartnerControls">
+  <documentManagement/>
+</p:properties>
 </file>
 
 <file path=customXml/item2.xml><?xml version="1.0" encoding="utf-8"?>
@@ -12185,15 +12163,26 @@
 </file>
 
 <file path=customXml/item3.xml><?xml version="1.0" encoding="utf-8"?>
-<p:properties xmlns:p="http://schemas.microsoft.com/office/2006/metadata/properties" xmlns:xsi="http://www.w3.org/2001/XMLSchema-instance" xmlns:pc="http://schemas.microsoft.com/office/infopath/2007/PartnerControls">
-  <documentManagement/>
-</p:properties>
+<?mso-contentType ?>
+<FormTemplates xmlns="http://schemas.microsoft.com/sharepoint/v3/contenttype/forms">
+  <Display>DocumentLibraryForm</Display>
+  <Edit>DocumentLibraryForm</Edit>
+  <New>DocumentLibraryForm</New>
+</FormTemplates>
 </file>
 
 <file path=customXml/itemProps1.xml><?xml version="1.0" encoding="utf-8"?>
-<ds:datastoreItem xmlns:ds="http://schemas.openxmlformats.org/officeDocument/2006/customXml" ds:itemID="{B0CA13EC-1D3C-4D6F-8D1C-E8A452CFC79A}">
+<ds:datastoreItem xmlns:ds="http://schemas.openxmlformats.org/officeDocument/2006/customXml" ds:itemID="{7025FDD9-4C58-4084-9F89-0E6ADD6FFF55}">
   <ds:schemaRefs>
-    <ds:schemaRef ds:uri="http://schemas.microsoft.com/sharepoint/v3/contenttype/forms"/>
+    <ds:schemaRef ds:uri="http://purl.org/dc/dcmitype/"/>
+    <ds:schemaRef ds:uri="http://schemas.microsoft.com/office/infopath/2007/PartnerControls"/>
+    <ds:schemaRef ds:uri="http://purl.org/dc/elements/1.1/"/>
+    <ds:schemaRef ds:uri="636b0322-90fb-440c-9cbc-22749e7231e9"/>
+    <ds:schemaRef ds:uri="http://schemas.microsoft.com/office/2006/metadata/properties"/>
+    <ds:schemaRef ds:uri="http://www.w3.org/XML/1998/namespace"/>
+    <ds:schemaRef ds:uri="http://purl.org/dc/terms/"/>
+    <ds:schemaRef ds:uri="http://schemas.microsoft.com/office/2006/documentManagement/types"/>
+    <ds:schemaRef ds:uri="http://schemas.openxmlformats.org/package/2006/metadata/core-properties"/>
   </ds:schemaRefs>
 </ds:datastoreItem>
 </file>
@@ -12217,17 +12206,9 @@
 </file>
 
 <file path=customXml/itemProps3.xml><?xml version="1.0" encoding="utf-8"?>
-<ds:datastoreItem xmlns:ds="http://schemas.openxmlformats.org/officeDocument/2006/customXml" ds:itemID="{7025FDD9-4C58-4084-9F89-0E6ADD6FFF55}">
+<ds:datastoreItem xmlns:ds="http://schemas.openxmlformats.org/officeDocument/2006/customXml" ds:itemID="{B0CA13EC-1D3C-4D6F-8D1C-E8A452CFC79A}">
   <ds:schemaRefs>
-    <ds:schemaRef ds:uri="http://purl.org/dc/dcmitype/"/>
-    <ds:schemaRef ds:uri="http://schemas.microsoft.com/office/infopath/2007/PartnerControls"/>
-    <ds:schemaRef ds:uri="http://purl.org/dc/elements/1.1/"/>
-    <ds:schemaRef ds:uri="636b0322-90fb-440c-9cbc-22749e7231e9"/>
-    <ds:schemaRef ds:uri="http://schemas.microsoft.com/office/2006/metadata/properties"/>
-    <ds:schemaRef ds:uri="http://www.w3.org/XML/1998/namespace"/>
-    <ds:schemaRef ds:uri="http://purl.org/dc/terms/"/>
-    <ds:schemaRef ds:uri="http://schemas.microsoft.com/office/2006/documentManagement/types"/>
-    <ds:schemaRef ds:uri="http://schemas.openxmlformats.org/package/2006/metadata/core-properties"/>
+    <ds:schemaRef ds:uri="http://schemas.microsoft.com/sharepoint/v3/contenttype/forms"/>
   </ds:schemaRefs>
 </ds:datastoreItem>
 </file>
</xml_diff>